<commit_message>
week 13: typo in slides
</commit_message>
<xml_diff>
--- a/week_13/week_13.pptx
+++ b/week_13/week_13.pptx
@@ -212,7 +212,7 @@
           <a:p>
             <a:fld id="{A756DEA0-F944-5946-9B95-BC7B5255CD05}" type="datetimeFigureOut">
               <a:rPr lang="en-US" smtClean="0"/>
-              <a:t>4/20/16</a:t>
+              <a:t>4/22/16</a:t>
             </a:fld>
             <a:endParaRPr lang="en-US"/>
           </a:p>
@@ -1572,7 +1572,7 @@
           <a:p>
             <a:fld id="{9E016143-E03C-4CFD-AFDC-14E5BDEA754C}" type="datetimeFigureOut">
               <a:rPr lang="en-US" dirty="0"/>
-              <a:t>4/20/16</a:t>
+              <a:t>4/22/16</a:t>
             </a:fld>
             <a:endParaRPr lang="en-US" dirty="0"/>
           </a:p>
@@ -1796,7 +1796,7 @@
           <a:p>
             <a:fld id="{C033E54A-A8CA-48C1-9504-691B58049D29}" type="datetimeFigureOut">
               <a:rPr lang="en-US" dirty="0"/>
-              <a:t>4/20/16</a:t>
+              <a:t>4/22/16</a:t>
             </a:fld>
             <a:endParaRPr lang="en-US" dirty="0"/>
           </a:p>
@@ -1971,7 +1971,7 @@
           <a:p>
             <a:fld id="{B5F6C806-BBF7-471C-9527-881CE2266695}" type="datetimeFigureOut">
               <a:rPr lang="en-US" dirty="0"/>
-              <a:t>4/20/16</a:t>
+              <a:t>4/22/16</a:t>
             </a:fld>
             <a:endParaRPr lang="en-US" dirty="0"/>
           </a:p>
@@ -2136,7 +2136,7 @@
           <a:p>
             <a:fld id="{78C94063-DF36-4330-A365-08DA1FA5B7D6}" type="datetimeFigureOut">
               <a:rPr lang="en-US" dirty="0"/>
-              <a:t>4/20/16</a:t>
+              <a:t>4/22/16</a:t>
             </a:fld>
             <a:endParaRPr lang="en-US" dirty="0"/>
           </a:p>
@@ -2385,7 +2385,7 @@
           <a:p>
             <a:fld id="{908A7C6C-0F39-4D70-8E8D-FE5B9C95FA73}" type="datetimeFigureOut">
               <a:rPr lang="en-US" dirty="0"/>
-              <a:t>4/20/16</a:t>
+              <a:t>4/22/16</a:t>
             </a:fld>
             <a:endParaRPr lang="en-US" dirty="0"/>
           </a:p>
@@ -2706,7 +2706,7 @@
           <a:p>
             <a:fld id="{DFCFA4AC-08CC-42CE-BD01-C191750A04EC}" type="datetimeFigureOut">
               <a:rPr lang="en-US" dirty="0"/>
-              <a:t>4/20/16</a:t>
+              <a:t>4/22/16</a:t>
             </a:fld>
             <a:endParaRPr lang="en-US" dirty="0"/>
           </a:p>
@@ -3152,7 +3152,7 @@
           <a:p>
             <a:fld id="{1BA7A723-92A7-435B-B681-F25B092FEFEB}" type="datetimeFigureOut">
               <a:rPr lang="en-US" dirty="0"/>
-              <a:t>4/20/16</a:t>
+              <a:t>4/22/16</a:t>
             </a:fld>
             <a:endParaRPr lang="en-US" dirty="0"/>
           </a:p>
@@ -3265,7 +3265,7 @@
           <a:p>
             <a:fld id="{4F170639-886C-4FCF-9EAB-ABB5DA3F3F4A}" type="datetimeFigureOut">
               <a:rPr lang="en-US" dirty="0"/>
-              <a:t>4/20/16</a:t>
+              <a:t>4/22/16</a:t>
             </a:fld>
             <a:endParaRPr lang="en-US" dirty="0"/>
           </a:p>
@@ -3355,7 +3355,7 @@
           <a:p>
             <a:fld id="{22230651-31F4-45D2-98AE-A2108F41BC07}" type="datetimeFigureOut">
               <a:rPr lang="en-US" dirty="0"/>
-              <a:t>4/20/16</a:t>
+              <a:t>4/22/16</a:t>
             </a:fld>
             <a:endParaRPr lang="en-US" dirty="0"/>
           </a:p>
@@ -3637,7 +3637,7 @@
           <a:p>
             <a:fld id="{6F53789A-C914-4DB1-8815-80B5EC7335C5}" type="datetimeFigureOut">
               <a:rPr lang="en-US" dirty="0"/>
-              <a:t>4/20/16</a:t>
+              <a:t>4/22/16</a:t>
             </a:fld>
             <a:endParaRPr lang="en-US" dirty="0"/>
           </a:p>
@@ -3957,7 +3957,7 @@
           <a:p>
             <a:fld id="{5E6440AA-91A0-436F-8FDB-C0F939DCAE21}" type="datetimeFigureOut">
               <a:rPr lang="en-US" dirty="0"/>
-              <a:t>4/20/16</a:t>
+              <a:t>4/22/16</a:t>
             </a:fld>
             <a:endParaRPr lang="en-US" dirty="0"/>
           </a:p>
@@ -4206,7 +4206,7 @@
           <a:p>
             <a:fld id="{0E59FD0C-5451-4CA0-86AF-E70AE3279989}" type="datetimeFigureOut">
               <a:rPr lang="en-US" dirty="0"/>
-              <a:t>4/20/16</a:t>
+              <a:t>4/22/16</a:t>
             </a:fld>
             <a:endParaRPr lang="en-US" dirty="0"/>
           </a:p>
@@ -4731,30 +4731,13 @@
           <a:p>
             <a:r>
               <a:rPr lang="en-US" dirty="0" smtClean="0"/>
-              <a:t>Week </a:t>
-            </a:r>
+              <a:t>Week 13: Concurrency and Threading</a:t>
+            </a:r>
+          </a:p>
+          <a:p>
             <a:r>
               <a:rPr lang="en-US" dirty="0" smtClean="0"/>
-              <a:t>13: Concurrency and Threading</a:t>
-            </a:r>
-            <a:endParaRPr lang="en-US" dirty="0" smtClean="0"/>
-          </a:p>
-          <a:p>
-            <a:r>
-              <a:rPr lang="en-US" dirty="0" smtClean="0"/>
-              <a:t>April </a:t>
-            </a:r>
-            <a:r>
-              <a:rPr lang="en-US" dirty="0" smtClean="0"/>
-              <a:t>21</a:t>
-            </a:r>
-            <a:r>
-              <a:rPr lang="en-US" dirty="0" smtClean="0"/>
-              <a:t>, </a:t>
-            </a:r>
-            <a:r>
-              <a:rPr lang="en-US" dirty="0" smtClean="0"/>
-              <a:t>2016</a:t>
+              <a:t>April 21, 2016</a:t>
             </a:r>
             <a:endParaRPr lang="en-US" dirty="0"/>
           </a:p>
@@ -4858,7 +4841,6 @@
               <a:rPr lang="en-US" sz="3000" dirty="0" smtClean="0"/>
               <a:t>The Concurrency Utilities framework provides higher-level classes and interfaces to simplify threading</a:t>
             </a:r>
-            <a:endParaRPr lang="en-US" sz="3000" dirty="0" smtClean="0"/>
           </a:p>
         </p:txBody>
       </p:sp>
@@ -5216,7 +5198,6 @@
               <a:rPr lang="en-US" sz="3000" dirty="0" smtClean="0"/>
               <a:t> </a:t>
             </a:r>
-            <a:endParaRPr lang="en-US" sz="3000" dirty="0" smtClean="0"/>
           </a:p>
         </p:txBody>
       </p:sp>
@@ -5645,7 +5626,62 @@
                 <a:ea typeface="Consolas" charset="0"/>
                 <a:cs typeface="Consolas" charset="0"/>
               </a:rPr>
-              <a:t>some code synchronize(object) { </a:t>
+              <a:t>some </a:t>
+            </a:r>
+            <a:r>
+              <a:rPr lang="en-US" sz="3200">
+                <a:solidFill>
+                  <a:srgbClr val="FF0000"/>
+                </a:solidFill>
+                <a:latin typeface="Consolas" charset="0"/>
+                <a:ea typeface="Consolas" charset="0"/>
+                <a:cs typeface="Consolas" charset="0"/>
+              </a:rPr>
+              <a:t>code </a:t>
+            </a:r>
+            <a:endParaRPr lang="en-US" sz="3200" smtClean="0">
+              <a:solidFill>
+                <a:srgbClr val="FF0000"/>
+              </a:solidFill>
+              <a:latin typeface="Consolas" charset="0"/>
+              <a:ea typeface="Consolas" charset="0"/>
+              <a:cs typeface="Consolas" charset="0"/>
+            </a:endParaRPr>
+          </a:p>
+          <a:p>
+            <a:pPr marL="0" indent="0">
+              <a:lnSpc>
+                <a:spcPct val="120000"/>
+              </a:lnSpc>
+              <a:spcBef>
+                <a:spcPts val="0"/>
+              </a:spcBef>
+              <a:spcAft>
+                <a:spcPts val="0"/>
+              </a:spcAft>
+              <a:buNone/>
+            </a:pPr>
+            <a:r>
+              <a:rPr lang="en-US" sz="3200" smtClean="0">
+                <a:solidFill>
+                  <a:srgbClr val="FF0000"/>
+                </a:solidFill>
+                <a:latin typeface="Consolas" charset="0"/>
+                <a:ea typeface="Consolas" charset="0"/>
+                <a:cs typeface="Consolas" charset="0"/>
+              </a:rPr>
+              <a:t>synchronize(object</a:t>
+            </a:r>
+            <a:r>
+              <a:rPr lang="en-US" sz="3200" dirty="0">
+                <a:solidFill>
+                  <a:srgbClr val="FF0000"/>
+                </a:solidFill>
+                <a:latin typeface="Consolas" charset="0"/>
+                <a:ea typeface="Consolas" charset="0"/>
+                <a:cs typeface="Consolas" charset="0"/>
+              </a:rPr>
+              <a:t>) { </a:t>
             </a:r>
             <a:endParaRPr lang="en-US" sz="3200" dirty="0" smtClean="0">
               <a:solidFill>
@@ -5930,11 +5966,7 @@
             </a:r>
             <a:r>
               <a:rPr lang="en-US" sz="2800" dirty="0" smtClean="0"/>
-              <a:t>, pp. </a:t>
-            </a:r>
-            <a:r>
-              <a:rPr lang="en-US" sz="2800" dirty="0" smtClean="0"/>
-              <a:t>324-354, 487-536</a:t>
+              <a:t>, pp. 324-354, 487-536</a:t>
             </a:r>
             <a:endParaRPr lang="en-US" sz="2800" i="1" dirty="0"/>
           </a:p>
@@ -6156,11 +6188,7 @@
           <a:p>
             <a:r>
               <a:rPr lang="en-US" dirty="0" smtClean="0"/>
-              <a:t>Runnable Interface</a:t>
-            </a:r>
-            <a:r>
-              <a:rPr lang="en-US" dirty="0" smtClean="0"/>
-              <a:t>	</a:t>
+              <a:t>Runnable Interface	</a:t>
             </a:r>
             <a:endParaRPr lang="en-US" dirty="0"/>
           </a:p>
@@ -6193,7 +6221,6 @@
               <a:rPr lang="en-US" sz="3000" dirty="0" smtClean="0"/>
               <a:t>Declares a single method that takes no parameters and returns no value</a:t>
             </a:r>
-            <a:endParaRPr lang="en-US" sz="3000" dirty="0" smtClean="0"/>
           </a:p>
         </p:txBody>
       </p:sp>
@@ -6604,7 +6631,6 @@
               <a:rPr lang="en-US" sz="3000" dirty="0" smtClean="0"/>
               <a:t> method</a:t>
             </a:r>
-            <a:endParaRPr lang="en-US" sz="3000" dirty="0" smtClean="0"/>
           </a:p>
         </p:txBody>
       </p:sp>
@@ -6686,11 +6712,7 @@
           <a:p>
             <a:r>
               <a:rPr lang="en-US" sz="3000" dirty="0" smtClean="0"/>
-              <a:t>We can use uncaught exception handlers to deal with exceptions that occur in threads that aren’t handled elsewhere in th</a:t>
-            </a:r>
-            <a:r>
-              <a:rPr lang="en-US" sz="3000" dirty="0" smtClean="0"/>
-              <a:t>e thread</a:t>
+              <a:t>We can use uncaught exception handlers to deal with exceptions that occur in threads that aren’t handled elsewhere in the thread</a:t>
             </a:r>
           </a:p>
         </p:txBody>

</xml_diff>